<commit_message>
Finalizing the readme as well as the notebook
</commit_message>
<xml_diff>
--- a/Social_Buzz_Data_Analysis.pptx
+++ b/Social_Buzz_Data_Analysis.pptx
@@ -229,7 +229,7 @@
           <a:p>
             <a:fld id="{B7268E1E-0E44-426D-905E-8AD9B19D2182}" type="datetimeFigureOut">
               <a:rPr lang="cs-CZ" smtClean="0"/>
-              <a:t>10.01.2024</a:t>
+              <a:t>14.01.2024</a:t>
             </a:fld>
             <a:endParaRPr lang="cs-CZ"/>
           </a:p>
@@ -574,7 +574,7 @@
           <a:p>
             <a:fld id="{B7268E1E-0E44-426D-905E-8AD9B19D2182}" type="datetimeFigureOut">
               <a:rPr lang="cs-CZ" smtClean="0"/>
-              <a:t>10.01.2024</a:t>
+              <a:t>14.01.2024</a:t>
             </a:fld>
             <a:endParaRPr lang="cs-CZ"/>
           </a:p>
@@ -792,7 +792,7 @@
           <a:p>
             <a:fld id="{B7268E1E-0E44-426D-905E-8AD9B19D2182}" type="datetimeFigureOut">
               <a:rPr lang="cs-CZ" smtClean="0"/>
-              <a:t>10.01.2024</a:t>
+              <a:t>14.01.2024</a:t>
             </a:fld>
             <a:endParaRPr lang="cs-CZ"/>
           </a:p>
@@ -1015,7 +1015,7 @@
           <a:p>
             <a:fld id="{B7268E1E-0E44-426D-905E-8AD9B19D2182}" type="datetimeFigureOut">
               <a:rPr lang="cs-CZ" smtClean="0"/>
-              <a:t>10.01.2024</a:t>
+              <a:t>14.01.2024</a:t>
             </a:fld>
             <a:endParaRPr lang="cs-CZ"/>
           </a:p>
@@ -1238,7 +1238,7 @@
           <a:p>
             <a:fld id="{B7268E1E-0E44-426D-905E-8AD9B19D2182}" type="datetimeFigureOut">
               <a:rPr lang="cs-CZ" smtClean="0"/>
-              <a:t>10.01.2024</a:t>
+              <a:t>14.01.2024</a:t>
             </a:fld>
             <a:endParaRPr lang="cs-CZ"/>
           </a:p>
@@ -1456,7 +1456,7 @@
           <a:p>
             <a:fld id="{B7268E1E-0E44-426D-905E-8AD9B19D2182}" type="datetimeFigureOut">
               <a:rPr lang="cs-CZ" smtClean="0"/>
-              <a:t>10.01.2024</a:t>
+              <a:t>14.01.2024</a:t>
             </a:fld>
             <a:endParaRPr lang="cs-CZ"/>
           </a:p>
@@ -1674,7 +1674,7 @@
           <a:p>
             <a:fld id="{B7268E1E-0E44-426D-905E-8AD9B19D2182}" type="datetimeFigureOut">
               <a:rPr lang="cs-CZ" smtClean="0"/>
-              <a:t>10.01.2024</a:t>
+              <a:t>14.01.2024</a:t>
             </a:fld>
             <a:endParaRPr lang="cs-CZ"/>
           </a:p>
@@ -1892,7 +1892,7 @@
           <a:p>
             <a:fld id="{B7268E1E-0E44-426D-905E-8AD9B19D2182}" type="datetimeFigureOut">
               <a:rPr lang="cs-CZ" smtClean="0"/>
-              <a:t>10.01.2024</a:t>
+              <a:t>14.01.2024</a:t>
             </a:fld>
             <a:endParaRPr lang="cs-CZ"/>
           </a:p>
@@ -2110,7 +2110,7 @@
           <a:p>
             <a:fld id="{B7268E1E-0E44-426D-905E-8AD9B19D2182}" type="datetimeFigureOut">
               <a:rPr lang="cs-CZ" smtClean="0"/>
-              <a:t>10.01.2024</a:t>
+              <a:t>14.01.2024</a:t>
             </a:fld>
             <a:endParaRPr lang="cs-CZ"/>
           </a:p>
@@ -2328,7 +2328,7 @@
           <a:p>
             <a:fld id="{B7268E1E-0E44-426D-905E-8AD9B19D2182}" type="datetimeFigureOut">
               <a:rPr lang="cs-CZ" smtClean="0"/>
-              <a:t>10.01.2024</a:t>
+              <a:t>14.01.2024</a:t>
             </a:fld>
             <a:endParaRPr lang="cs-CZ"/>
           </a:p>
@@ -2546,7 +2546,7 @@
           <a:p>
             <a:fld id="{B7268E1E-0E44-426D-905E-8AD9B19D2182}" type="datetimeFigureOut">
               <a:rPr lang="cs-CZ" smtClean="0"/>
-              <a:t>10.01.2024</a:t>
+              <a:t>14.01.2024</a:t>
             </a:fld>
             <a:endParaRPr lang="cs-CZ"/>
           </a:p>
@@ -2764,7 +2764,7 @@
           <a:p>
             <a:fld id="{B7268E1E-0E44-426D-905E-8AD9B19D2182}" type="datetimeFigureOut">
               <a:rPr lang="cs-CZ" smtClean="0"/>
-              <a:t>10.01.2024</a:t>
+              <a:t>14.01.2024</a:t>
             </a:fld>
             <a:endParaRPr lang="cs-CZ"/>
           </a:p>
@@ -2982,7 +2982,7 @@
           <a:p>
             <a:fld id="{B7268E1E-0E44-426D-905E-8AD9B19D2182}" type="datetimeFigureOut">
               <a:rPr lang="cs-CZ" smtClean="0"/>
-              <a:t>10.01.2024</a:t>
+              <a:t>14.01.2024</a:t>
             </a:fld>
             <a:endParaRPr lang="cs-CZ"/>
           </a:p>
@@ -3200,7 +3200,7 @@
           <a:p>
             <a:fld id="{B7268E1E-0E44-426D-905E-8AD9B19D2182}" type="datetimeFigureOut">
               <a:rPr lang="cs-CZ" smtClean="0"/>
-              <a:t>10.01.2024</a:t>
+              <a:t>14.01.2024</a:t>
             </a:fld>
             <a:endParaRPr lang="cs-CZ"/>
           </a:p>
@@ -3526,7 +3526,7 @@
             <a:fld id="{1D8BD707-D9CF-40AE-B4C6-C98DA3205C09}" type="datetimeFigureOut">
               <a:rPr lang="en-US" smtClean="0"/>
               <a:pPr/>
-              <a:t>1/10/2024</a:t>
+              <a:t>1/14/2024</a:t>
             </a:fld>
             <a:endParaRPr lang="en-US"/>
           </a:p>
@@ -3691,7 +3691,7 @@
             <a:fld id="{1D8BD707-D9CF-40AE-B4C6-C98DA3205C09}" type="datetimeFigureOut">
               <a:rPr lang="en-US" smtClean="0"/>
               <a:pPr/>
-              <a:t>1/10/2024</a:t>
+              <a:t>1/14/2024</a:t>
             </a:fld>
             <a:endParaRPr lang="en-US"/>
           </a:p>
@@ -3866,7 +3866,7 @@
             <a:fld id="{1D8BD707-D9CF-40AE-B4C6-C98DA3205C09}" type="datetimeFigureOut">
               <a:rPr lang="en-US" smtClean="0"/>
               <a:pPr/>
-              <a:t>1/10/2024</a:t>
+              <a:t>1/14/2024</a:t>
             </a:fld>
             <a:endParaRPr lang="en-US"/>
           </a:p>
@@ -4031,7 +4031,7 @@
             <a:fld id="{1D8BD707-D9CF-40AE-B4C6-C98DA3205C09}" type="datetimeFigureOut">
               <a:rPr lang="en-US" smtClean="0"/>
               <a:pPr/>
-              <a:t>1/10/2024</a:t>
+              <a:t>1/14/2024</a:t>
             </a:fld>
             <a:endParaRPr lang="en-US"/>
           </a:p>
@@ -4273,7 +4273,7 @@
             <a:fld id="{1D8BD707-D9CF-40AE-B4C6-C98DA3205C09}" type="datetimeFigureOut">
               <a:rPr lang="en-US" smtClean="0"/>
               <a:pPr/>
-              <a:t>1/10/2024</a:t>
+              <a:t>1/14/2024</a:t>
             </a:fld>
             <a:endParaRPr lang="en-US"/>
           </a:p>
@@ -4555,7 +4555,7 @@
             <a:fld id="{1D8BD707-D9CF-40AE-B4C6-C98DA3205C09}" type="datetimeFigureOut">
               <a:rPr lang="en-US" smtClean="0"/>
               <a:pPr/>
-              <a:t>1/10/2024</a:t>
+              <a:t>1/14/2024</a:t>
             </a:fld>
             <a:endParaRPr lang="en-US"/>
           </a:p>
@@ -4971,7 +4971,7 @@
             <a:fld id="{1D8BD707-D9CF-40AE-B4C6-C98DA3205C09}" type="datetimeFigureOut">
               <a:rPr lang="en-US" smtClean="0"/>
               <a:pPr/>
-              <a:t>1/10/2024</a:t>
+              <a:t>1/14/2024</a:t>
             </a:fld>
             <a:endParaRPr lang="en-US"/>
           </a:p>
@@ -5085,7 +5085,7 @@
             <a:fld id="{1D8BD707-D9CF-40AE-B4C6-C98DA3205C09}" type="datetimeFigureOut">
               <a:rPr lang="en-US" smtClean="0"/>
               <a:pPr/>
-              <a:t>1/10/2024</a:t>
+              <a:t>1/14/2024</a:t>
             </a:fld>
             <a:endParaRPr lang="en-US"/>
           </a:p>
@@ -5177,7 +5177,7 @@
             <a:fld id="{1D8BD707-D9CF-40AE-B4C6-C98DA3205C09}" type="datetimeFigureOut">
               <a:rPr lang="en-US" smtClean="0"/>
               <a:pPr/>
-              <a:t>1/10/2024</a:t>
+              <a:t>1/14/2024</a:t>
             </a:fld>
             <a:endParaRPr lang="en-US"/>
           </a:p>
@@ -5449,7 +5449,7 @@
             <a:fld id="{1D8BD707-D9CF-40AE-B4C6-C98DA3205C09}" type="datetimeFigureOut">
               <a:rPr lang="en-US" smtClean="0"/>
               <a:pPr/>
-              <a:t>1/10/2024</a:t>
+              <a:t>1/14/2024</a:t>
             </a:fld>
             <a:endParaRPr lang="en-US"/>
           </a:p>
@@ -5698,7 +5698,7 @@
             <a:fld id="{1D8BD707-D9CF-40AE-B4C6-C98DA3205C09}" type="datetimeFigureOut">
               <a:rPr lang="en-US" smtClean="0"/>
               <a:pPr/>
-              <a:t>1/10/2024</a:t>
+              <a:t>1/14/2024</a:t>
             </a:fld>
             <a:endParaRPr lang="en-US"/>
           </a:p>
@@ -5906,7 +5906,7 @@
             <a:fld id="{1D8BD707-D9CF-40AE-B4C6-C98DA3205C09}" type="datetimeFigureOut">
               <a:rPr lang="en-US" smtClean="0"/>
               <a:pPr/>
-              <a:t>1/10/2024</a:t>
+              <a:t>1/14/2024</a:t>
             </a:fld>
             <a:endParaRPr lang="en-US"/>
           </a:p>
@@ -8212,10 +8212,10 @@
       </p:sp>
       <p:pic>
         <p:nvPicPr>
-          <p:cNvPr id="17" name="Picture 16">
+          <p:cNvPr id="16" name="Picture 15">
             <a:extLst>
               <a:ext uri="{FF2B5EF4-FFF2-40B4-BE49-F238E27FC236}">
-                <a16:creationId xmlns:a16="http://schemas.microsoft.com/office/drawing/2014/main" id="{CD76CE1E-F8C5-4908-B70E-200B237D17F6}"/>
+                <a16:creationId xmlns:a16="http://schemas.microsoft.com/office/drawing/2014/main" id="{6AAEB927-C927-4A5E-B462-3A148FE840A3}"/>
               </a:ext>
             </a:extLst>
           </p:cNvPr>
@@ -8232,8 +8232,8 @@
         </p:blipFill>
         <p:spPr>
           <a:xfrm>
-            <a:off x="9857467" y="1205644"/>
-            <a:ext cx="6449333" cy="5474675"/>
+            <a:off x="9745988" y="1412035"/>
+            <a:ext cx="6173142" cy="5240223"/>
           </a:xfrm>
           <a:prstGeom prst="rect">
             <a:avLst/>
@@ -17878,36 +17878,6 @@
           </a:p>
         </p:txBody>
       </p:sp>
-      <p:pic>
-        <p:nvPicPr>
-          <p:cNvPr id="29" name="Picture 28">
-            <a:extLst>
-              <a:ext uri="{FF2B5EF4-FFF2-40B4-BE49-F238E27FC236}">
-                <a16:creationId xmlns:a16="http://schemas.microsoft.com/office/drawing/2014/main" id="{35731D27-4568-48F3-B7E2-357334257D0D}"/>
-              </a:ext>
-            </a:extLst>
-          </p:cNvPr>
-          <p:cNvPicPr>
-            <a:picLocks noChangeAspect="1"/>
-          </p:cNvPicPr>
-          <p:nvPr/>
-        </p:nvPicPr>
-        <p:blipFill>
-          <a:blip r:embed="rId7"/>
-          <a:stretch>
-            <a:fillRect/>
-          </a:stretch>
-        </p:blipFill>
-        <p:spPr>
-          <a:xfrm>
-            <a:off x="2411472" y="2142324"/>
-            <a:ext cx="10681869" cy="7519150"/>
-          </a:xfrm>
-          <a:prstGeom prst="rect">
-            <a:avLst/>
-          </a:prstGeom>
-        </p:spPr>
-      </p:pic>
       <p:sp>
         <p:nvSpPr>
           <p:cNvPr id="30" name="TextBox 29">
@@ -18498,6 +18468,36 @@
           </p:spPr>
         </p:pic>
       </p:grpSp>
+      <p:pic>
+        <p:nvPicPr>
+          <p:cNvPr id="3" name="Picture 2">
+            <a:extLst>
+              <a:ext uri="{FF2B5EF4-FFF2-40B4-BE49-F238E27FC236}">
+                <a16:creationId xmlns:a16="http://schemas.microsoft.com/office/drawing/2014/main" id="{746DE1B4-DC9B-4589-A5F3-3A9D5E68B38A}"/>
+              </a:ext>
+            </a:extLst>
+          </p:cNvPr>
+          <p:cNvPicPr>
+            <a:picLocks noChangeAspect="1"/>
+          </p:cNvPicPr>
+          <p:nvPr/>
+        </p:nvPicPr>
+        <p:blipFill>
+          <a:blip r:embed="rId7"/>
+          <a:stretch>
+            <a:fillRect/>
+          </a:stretch>
+        </p:blipFill>
+        <p:spPr>
+          <a:xfrm>
+            <a:off x="2496005" y="1535850"/>
+            <a:ext cx="10876766" cy="7586420"/>
+          </a:xfrm>
+          <a:prstGeom prst="rect">
+            <a:avLst/>
+          </a:prstGeom>
+        </p:spPr>
+      </p:pic>
     </p:spTree>
   </p:cSld>
   <p:clrMapOvr>
@@ -18945,36 +18945,6 @@
           </a:p>
         </p:txBody>
       </p:sp>
-      <p:pic>
-        <p:nvPicPr>
-          <p:cNvPr id="29" name="Picture 28">
-            <a:extLst>
-              <a:ext uri="{FF2B5EF4-FFF2-40B4-BE49-F238E27FC236}">
-                <a16:creationId xmlns:a16="http://schemas.microsoft.com/office/drawing/2014/main" id="{9F78BBE0-64E9-4003-90D1-65ECA55D64BE}"/>
-              </a:ext>
-            </a:extLst>
-          </p:cNvPr>
-          <p:cNvPicPr>
-            <a:picLocks noChangeAspect="1"/>
-          </p:cNvPicPr>
-          <p:nvPr/>
-        </p:nvPicPr>
-        <p:blipFill>
-          <a:blip r:embed="rId7"/>
-          <a:stretch>
-            <a:fillRect/>
-          </a:stretch>
-        </p:blipFill>
-        <p:spPr>
-          <a:xfrm>
-            <a:off x="4808652" y="1045537"/>
-            <a:ext cx="11276984" cy="5647541"/>
-          </a:xfrm>
-          <a:prstGeom prst="rect">
-            <a:avLst/>
-          </a:prstGeom>
-        </p:spPr>
-      </p:pic>
       <p:sp>
         <p:nvSpPr>
           <p:cNvPr id="30" name="TextBox 29">
@@ -19616,6 +19586,36 @@
           </a:solidFill>
         </p:spPr>
       </p:sp>
+      <p:pic>
+        <p:nvPicPr>
+          <p:cNvPr id="15" name="Picture 14">
+            <a:extLst>
+              <a:ext uri="{FF2B5EF4-FFF2-40B4-BE49-F238E27FC236}">
+                <a16:creationId xmlns:a16="http://schemas.microsoft.com/office/drawing/2014/main" id="{1452D751-AD2E-4D6D-AD23-5025256F7191}"/>
+              </a:ext>
+            </a:extLst>
+          </p:cNvPr>
+          <p:cNvPicPr>
+            <a:picLocks noChangeAspect="1"/>
+          </p:cNvPicPr>
+          <p:nvPr/>
+        </p:nvPicPr>
+        <p:blipFill>
+          <a:blip r:embed="rId7"/>
+          <a:stretch>
+            <a:fillRect/>
+          </a:stretch>
+        </p:blipFill>
+        <p:spPr>
+          <a:xfrm>
+            <a:off x="5396913" y="1101406"/>
+            <a:ext cx="10630840" cy="5285772"/>
+          </a:xfrm>
+          <a:prstGeom prst="rect">
+            <a:avLst/>
+          </a:prstGeom>
+        </p:spPr>
+      </p:pic>
     </p:spTree>
     <p:extLst>
       <p:ext uri="{BB962C8B-B14F-4D97-AF65-F5344CB8AC3E}">

</xml_diff>